<commit_message>
Remove outdated library references and version info
</commit_message>
<xml_diff>
--- a/DesktopEmulator/Emulator/Documents/Emulator architecture.pptx
+++ b/DesktopEmulator/Emulator/Documents/Emulator architecture.pptx
@@ -104,6 +104,11 @@
       </a:defRPr>
     </a:lvl9pPr>
   </p:defaultTextStyle>
+  <p:extLst>
+    <p:ext uri="{EFAFB233-063F-42B5-8137-9DF3F51BA10A}">
+      <p15:sldGuideLst xmlns:p15="http://schemas.microsoft.com/office/powerpoint/2012/main"/>
+    </p:ext>
+  </p:extLst>
 </p:presentation>
 </file>
 
@@ -254,7 +259,7 @@
           <a:p>
             <a:fld id="{45605D93-74B2-458C-B1B1-5153EFC61A6F}" type="datetimeFigureOut">
               <a:rPr lang="en-US" smtClean="0"/>
-              <a:t>7/28/2023</a:t>
+              <a:t>10/28/2025</a:t>
             </a:fld>
             <a:endParaRPr lang="en-US"/>
           </a:p>
@@ -308,7 +313,7 @@
           <a:p>
             <a:fld id="{1EF1B9E3-8065-4DCD-B2ED-546DA374765A}" type="slidenum">
               <a:rPr lang="en-US" smtClean="0"/>
-              <a:t>‹#›</a:t>
+              <a:t>‹Nº›</a:t>
             </a:fld>
             <a:endParaRPr lang="en-US"/>
           </a:p>
@@ -452,7 +457,7 @@
           <a:p>
             <a:fld id="{45605D93-74B2-458C-B1B1-5153EFC61A6F}" type="datetimeFigureOut">
               <a:rPr lang="en-US" smtClean="0"/>
-              <a:t>7/28/2023</a:t>
+              <a:t>10/28/2025</a:t>
             </a:fld>
             <a:endParaRPr lang="en-US"/>
           </a:p>
@@ -506,7 +511,7 @@
           <a:p>
             <a:fld id="{1EF1B9E3-8065-4DCD-B2ED-546DA374765A}" type="slidenum">
               <a:rPr lang="en-US" smtClean="0"/>
-              <a:t>‹#›</a:t>
+              <a:t>‹Nº›</a:t>
             </a:fld>
             <a:endParaRPr lang="en-US"/>
           </a:p>
@@ -660,7 +665,7 @@
           <a:p>
             <a:fld id="{45605D93-74B2-458C-B1B1-5153EFC61A6F}" type="datetimeFigureOut">
               <a:rPr lang="en-US" smtClean="0"/>
-              <a:t>7/28/2023</a:t>
+              <a:t>10/28/2025</a:t>
             </a:fld>
             <a:endParaRPr lang="en-US"/>
           </a:p>
@@ -714,7 +719,7 @@
           <a:p>
             <a:fld id="{1EF1B9E3-8065-4DCD-B2ED-546DA374765A}" type="slidenum">
               <a:rPr lang="en-US" smtClean="0"/>
-              <a:t>‹#›</a:t>
+              <a:t>‹Nº›</a:t>
             </a:fld>
             <a:endParaRPr lang="en-US"/>
           </a:p>
@@ -858,7 +863,7 @@
           <a:p>
             <a:fld id="{45605D93-74B2-458C-B1B1-5153EFC61A6F}" type="datetimeFigureOut">
               <a:rPr lang="en-US" smtClean="0"/>
-              <a:t>7/28/2023</a:t>
+              <a:t>10/28/2025</a:t>
             </a:fld>
             <a:endParaRPr lang="en-US"/>
           </a:p>
@@ -912,7 +917,7 @@
           <a:p>
             <a:fld id="{1EF1B9E3-8065-4DCD-B2ED-546DA374765A}" type="slidenum">
               <a:rPr lang="en-US" smtClean="0"/>
-              <a:t>‹#›</a:t>
+              <a:t>‹Nº›</a:t>
             </a:fld>
             <a:endParaRPr lang="en-US"/>
           </a:p>
@@ -1133,7 +1138,7 @@
           <a:p>
             <a:fld id="{45605D93-74B2-458C-B1B1-5153EFC61A6F}" type="datetimeFigureOut">
               <a:rPr lang="en-US" smtClean="0"/>
-              <a:t>7/28/2023</a:t>
+              <a:t>10/28/2025</a:t>
             </a:fld>
             <a:endParaRPr lang="en-US"/>
           </a:p>
@@ -1187,7 +1192,7 @@
           <a:p>
             <a:fld id="{1EF1B9E3-8065-4DCD-B2ED-546DA374765A}" type="slidenum">
               <a:rPr lang="en-US" smtClean="0"/>
-              <a:t>‹#›</a:t>
+              <a:t>‹Nº›</a:t>
             </a:fld>
             <a:endParaRPr lang="en-US"/>
           </a:p>
@@ -1398,7 +1403,7 @@
           <a:p>
             <a:fld id="{45605D93-74B2-458C-B1B1-5153EFC61A6F}" type="datetimeFigureOut">
               <a:rPr lang="en-US" smtClean="0"/>
-              <a:t>7/28/2023</a:t>
+              <a:t>10/28/2025</a:t>
             </a:fld>
             <a:endParaRPr lang="en-US"/>
           </a:p>
@@ -1452,7 +1457,7 @@
           <a:p>
             <a:fld id="{1EF1B9E3-8065-4DCD-B2ED-546DA374765A}" type="slidenum">
               <a:rPr lang="en-US" smtClean="0"/>
-              <a:t>‹#›</a:t>
+              <a:t>‹Nº›</a:t>
             </a:fld>
             <a:endParaRPr lang="en-US"/>
           </a:p>
@@ -1810,7 +1815,7 @@
           <a:p>
             <a:fld id="{45605D93-74B2-458C-B1B1-5153EFC61A6F}" type="datetimeFigureOut">
               <a:rPr lang="en-US" smtClean="0"/>
-              <a:t>7/28/2023</a:t>
+              <a:t>10/28/2025</a:t>
             </a:fld>
             <a:endParaRPr lang="en-US"/>
           </a:p>
@@ -1864,7 +1869,7 @@
           <a:p>
             <a:fld id="{1EF1B9E3-8065-4DCD-B2ED-546DA374765A}" type="slidenum">
               <a:rPr lang="en-US" smtClean="0"/>
-              <a:t>‹#›</a:t>
+              <a:t>‹Nº›</a:t>
             </a:fld>
             <a:endParaRPr lang="en-US"/>
           </a:p>
@@ -1951,7 +1956,7 @@
           <a:p>
             <a:fld id="{45605D93-74B2-458C-B1B1-5153EFC61A6F}" type="datetimeFigureOut">
               <a:rPr lang="en-US" smtClean="0"/>
-              <a:t>7/28/2023</a:t>
+              <a:t>10/28/2025</a:t>
             </a:fld>
             <a:endParaRPr lang="en-US"/>
           </a:p>
@@ -2005,7 +2010,7 @@
           <a:p>
             <a:fld id="{1EF1B9E3-8065-4DCD-B2ED-546DA374765A}" type="slidenum">
               <a:rPr lang="en-US" smtClean="0"/>
-              <a:t>‹#›</a:t>
+              <a:t>‹Nº›</a:t>
             </a:fld>
             <a:endParaRPr lang="en-US"/>
           </a:p>
@@ -2064,7 +2069,7 @@
           <a:p>
             <a:fld id="{45605D93-74B2-458C-B1B1-5153EFC61A6F}" type="datetimeFigureOut">
               <a:rPr lang="en-US" smtClean="0"/>
-              <a:t>7/28/2023</a:t>
+              <a:t>10/28/2025</a:t>
             </a:fld>
             <a:endParaRPr lang="en-US"/>
           </a:p>
@@ -2118,7 +2123,7 @@
           <a:p>
             <a:fld id="{1EF1B9E3-8065-4DCD-B2ED-546DA374765A}" type="slidenum">
               <a:rPr lang="en-US" smtClean="0"/>
-              <a:t>‹#›</a:t>
+              <a:t>‹Nº›</a:t>
             </a:fld>
             <a:endParaRPr lang="en-US"/>
           </a:p>
@@ -2375,7 +2380,7 @@
           <a:p>
             <a:fld id="{45605D93-74B2-458C-B1B1-5153EFC61A6F}" type="datetimeFigureOut">
               <a:rPr lang="en-US" smtClean="0"/>
-              <a:t>7/28/2023</a:t>
+              <a:t>10/28/2025</a:t>
             </a:fld>
             <a:endParaRPr lang="en-US"/>
           </a:p>
@@ -2429,7 +2434,7 @@
           <a:p>
             <a:fld id="{1EF1B9E3-8065-4DCD-B2ED-546DA374765A}" type="slidenum">
               <a:rPr lang="en-US" smtClean="0"/>
-              <a:t>‹#›</a:t>
+              <a:t>‹Nº›</a:t>
             </a:fld>
             <a:endParaRPr lang="en-US"/>
           </a:p>
@@ -2663,7 +2668,7 @@
           <a:p>
             <a:fld id="{45605D93-74B2-458C-B1B1-5153EFC61A6F}" type="datetimeFigureOut">
               <a:rPr lang="en-US" smtClean="0"/>
-              <a:t>7/28/2023</a:t>
+              <a:t>10/28/2025</a:t>
             </a:fld>
             <a:endParaRPr lang="en-US"/>
           </a:p>
@@ -2717,7 +2722,7 @@
           <a:p>
             <a:fld id="{1EF1B9E3-8065-4DCD-B2ED-546DA374765A}" type="slidenum">
               <a:rPr lang="en-US" smtClean="0"/>
-              <a:t>‹#›</a:t>
+              <a:t>‹Nº›</a:t>
             </a:fld>
             <a:endParaRPr lang="en-US"/>
           </a:p>
@@ -2904,7 +2909,7 @@
           <a:p>
             <a:fld id="{45605D93-74B2-458C-B1B1-5153EFC61A6F}" type="datetimeFigureOut">
               <a:rPr lang="en-US" smtClean="0"/>
-              <a:t>7/28/2023</a:t>
+              <a:t>10/28/2025</a:t>
             </a:fld>
             <a:endParaRPr lang="en-US"/>
           </a:p>
@@ -2994,7 +2999,7 @@
           <a:p>
             <a:fld id="{1EF1B9E3-8065-4DCD-B2ED-546DA374765A}" type="slidenum">
               <a:rPr lang="en-US" smtClean="0"/>
-              <a:t>‹#›</a:t>
+              <a:t>‹Nº›</a:t>
             </a:fld>
             <a:endParaRPr lang="en-US"/>
           </a:p>
@@ -3849,7 +3854,7 @@
                 <a:latin typeface="Arial" panose="020B0604020202020204" pitchFamily="34" charset="0"/>
                 <a:cs typeface="Arial" panose="020B0604020202020204" pitchFamily="34" charset="0"/>
               </a:rPr>
-              <a:t>( SDL + OpenGL )</a:t>
+              <a:t>( SDL2 + OpenGL )</a:t>
             </a:r>
           </a:p>
         </p:txBody>
@@ -3933,7 +3938,7 @@
                 <a:latin typeface="Arial" panose="020B0604020202020204" pitchFamily="34" charset="0"/>
                 <a:cs typeface="Arial" panose="020B0604020202020204" pitchFamily="34" charset="0"/>
               </a:rPr>
-              <a:t>( OpenAL )</a:t>
+              <a:t>( SDL2 )</a:t>
             </a:r>
           </a:p>
         </p:txBody>
@@ -4019,7 +4024,7 @@
                 <a:latin typeface="Arial" panose="020B0604020202020204" pitchFamily="34" charset="0"/>
                 <a:cs typeface="Arial" panose="020B0604020202020204" pitchFamily="34" charset="0"/>
               </a:rPr>
-              <a:t>( SDL )</a:t>
+              <a:t>( SDL2 )</a:t>
             </a:r>
           </a:p>
         </p:txBody>
@@ -4102,7 +4107,7 @@
                 <a:latin typeface="Arial" panose="020B0604020202020204" pitchFamily="34" charset="0"/>
                 <a:cs typeface="Arial" panose="020B0604020202020204" pitchFamily="34" charset="0"/>
               </a:rPr>
-              <a:t>( SDL + ImGui + osdialog )</a:t>
+              <a:t>( SDL2 + ImGui + osdialog )</a:t>
             </a:r>
           </a:p>
         </p:txBody>

</xml_diff>